<commit_message>
Changes to the docker file for django server
</commit_message>
<xml_diff>
--- a/EmotionClassification.pptx
+++ b/EmotionClassification.pptx
@@ -5,7 +5,7 @@
     <p:sldMasterId id="2147483986" r:id="rId1"/>
   </p:sldMasterIdLst>
   <p:notesMasterIdLst>
-    <p:notesMasterId r:id="rId10"/>
+    <p:notesMasterId r:id="rId11"/>
   </p:notesMasterIdLst>
   <p:sldIdLst>
     <p:sldId id="256" r:id="rId2"/>
@@ -16,6 +16,7 @@
     <p:sldId id="262" r:id="rId7"/>
     <p:sldId id="266" r:id="rId8"/>
     <p:sldId id="264" r:id="rId9"/>
+    <p:sldId id="268" r:id="rId10"/>
   </p:sldIdLst>
   <p:sldSz cx="12192000" cy="6858000"/>
   <p:notesSz cx="6858000" cy="9144000"/>
@@ -131,9 +132,13 @@
             <p14:sldId id="262"/>
             <p14:sldId id="266"/>
             <p14:sldId id="264"/>
+            <p14:sldId id="268"/>
           </p14:sldIdLst>
         </p14:section>
       </p14:sectionLst>
+    </p:ext>
+    <p:ext uri="{EFAFB233-063F-42B5-8137-9DF3F51BA10A}">
+      <p15:sldGuideLst xmlns:p15="http://schemas.microsoft.com/office/powerpoint/2012/main"/>
     </p:ext>
   </p:extLst>
 </p:presentation>
@@ -3935,7 +3940,25 @@
             <a:defRPr cap="all"/>
           </a:pPr>
           <a:r>
+            <a:rPr lang="en-US" dirty="0"/>
+            <a:t>Pre-Processing </a:t>
+          </a:r>
+        </a:p>
+        <a:p>
+          <a:pPr>
+            <a:defRPr cap="all"/>
+          </a:pPr>
+          <a:r>
             <a:rPr lang="en-US"/>
+            <a:t>And </a:t>
+          </a:r>
+        </a:p>
+        <a:p>
+          <a:pPr>
+            <a:defRPr cap="all"/>
+          </a:pPr>
+          <a:r>
+            <a:rPr lang="en-US" dirty="0"/>
             <a:t>Feature Engineering</a:t>
           </a:r>
         </a:p>
@@ -4052,7 +4075,7 @@
             <a:defRPr cap="all"/>
           </a:pPr>
           <a:r>
-            <a:rPr lang="en-US"/>
+            <a:rPr lang="en-US" dirty="0"/>
             <a:t>Scoring</a:t>
           </a:r>
         </a:p>
@@ -5799,7 +5822,7 @@
         </a:bodyPr>
         <a:lstStyle/>
         <a:p>
-          <a:pPr marL="0" lvl="0" indent="0" algn="ctr" defTabSz="533400">
+          <a:pPr marL="0" lvl="0" indent="0" algn="ctr" defTabSz="488950">
             <a:lnSpc>
               <a:spcPct val="90000"/>
             </a:lnSpc>
@@ -5813,7 +5836,7 @@
             <a:defRPr cap="all"/>
           </a:pPr>
           <a:r>
-            <a:rPr lang="en-US" sz="1200" kern="1200" dirty="0"/>
+            <a:rPr lang="en-US" sz="1100" kern="1200" dirty="0"/>
             <a:t>Online Streams</a:t>
           </a:r>
         </a:p>
@@ -5952,7 +5975,7 @@
         </a:bodyPr>
         <a:lstStyle/>
         <a:p>
-          <a:pPr marL="0" lvl="0" indent="0" algn="ctr" defTabSz="533400">
+          <a:pPr marL="0" lvl="0" indent="0" algn="ctr" defTabSz="488950">
             <a:lnSpc>
               <a:spcPct val="90000"/>
             </a:lnSpc>
@@ -5966,7 +5989,7 @@
             <a:defRPr cap="all"/>
           </a:pPr>
           <a:r>
-            <a:rPr lang="en-US" sz="1200" kern="1200"/>
+            <a:rPr lang="en-US" sz="1100" kern="1200"/>
             <a:t>Historical storage</a:t>
           </a:r>
         </a:p>
@@ -6105,7 +6128,7 @@
         </a:bodyPr>
         <a:lstStyle/>
         <a:p>
-          <a:pPr marL="0" lvl="0" indent="0" algn="ctr" defTabSz="533400">
+          <a:pPr marL="0" lvl="0" indent="0" algn="ctr" defTabSz="488950">
             <a:lnSpc>
               <a:spcPct val="90000"/>
             </a:lnSpc>
@@ -6119,7 +6142,45 @@
             <a:defRPr cap="all"/>
           </a:pPr>
           <a:r>
-            <a:rPr lang="en-US" sz="1200" kern="1200"/>
+            <a:rPr lang="en-US" sz="1100" kern="1200" dirty="0"/>
+            <a:t>Pre-Processing </a:t>
+          </a:r>
+        </a:p>
+        <a:p>
+          <a:pPr marL="0" lvl="0" indent="0" algn="ctr" defTabSz="488950">
+            <a:lnSpc>
+              <a:spcPct val="90000"/>
+            </a:lnSpc>
+            <a:spcBef>
+              <a:spcPct val="0"/>
+            </a:spcBef>
+            <a:spcAft>
+              <a:spcPct val="35000"/>
+            </a:spcAft>
+            <a:buNone/>
+            <a:defRPr cap="all"/>
+          </a:pPr>
+          <a:r>
+            <a:rPr lang="en-US" sz="1100" kern="1200"/>
+            <a:t>And </a:t>
+          </a:r>
+        </a:p>
+        <a:p>
+          <a:pPr marL="0" lvl="0" indent="0" algn="ctr" defTabSz="488950">
+            <a:lnSpc>
+              <a:spcPct val="90000"/>
+            </a:lnSpc>
+            <a:spcBef>
+              <a:spcPct val="0"/>
+            </a:spcBef>
+            <a:spcAft>
+              <a:spcPct val="35000"/>
+            </a:spcAft>
+            <a:buNone/>
+            <a:defRPr cap="all"/>
+          </a:pPr>
+          <a:r>
+            <a:rPr lang="en-US" sz="1100" kern="1200" dirty="0"/>
             <a:t>Feature Engineering</a:t>
           </a:r>
         </a:p>
@@ -6258,7 +6319,7 @@
         </a:bodyPr>
         <a:lstStyle/>
         <a:p>
-          <a:pPr marL="0" lvl="0" indent="0" algn="ctr" defTabSz="533400">
+          <a:pPr marL="0" lvl="0" indent="0" algn="ctr" defTabSz="488950">
             <a:lnSpc>
               <a:spcPct val="90000"/>
             </a:lnSpc>
@@ -6272,7 +6333,7 @@
             <a:defRPr cap="all"/>
           </a:pPr>
           <a:r>
-            <a:rPr lang="en-US" sz="1200" kern="1200"/>
+            <a:rPr lang="en-US" sz="1100" kern="1200"/>
             <a:t>Training/Evaluation</a:t>
           </a:r>
         </a:p>
@@ -6411,7 +6472,7 @@
         </a:bodyPr>
         <a:lstStyle/>
         <a:p>
-          <a:pPr marL="0" lvl="0" indent="0" algn="ctr" defTabSz="533400">
+          <a:pPr marL="0" lvl="0" indent="0" algn="ctr" defTabSz="488950">
             <a:lnSpc>
               <a:spcPct val="90000"/>
             </a:lnSpc>
@@ -6425,7 +6486,7 @@
             <a:defRPr cap="all"/>
           </a:pPr>
           <a:r>
-            <a:rPr lang="en-US" sz="1200" kern="1200"/>
+            <a:rPr lang="en-US" sz="1100" kern="1200"/>
             <a:t>Deployment</a:t>
           </a:r>
         </a:p>
@@ -6564,7 +6625,7 @@
         </a:bodyPr>
         <a:lstStyle/>
         <a:p>
-          <a:pPr marL="0" lvl="0" indent="0" algn="ctr" defTabSz="533400">
+          <a:pPr marL="0" lvl="0" indent="0" algn="ctr" defTabSz="488950">
             <a:lnSpc>
               <a:spcPct val="90000"/>
             </a:lnSpc>
@@ -6578,7 +6639,7 @@
             <a:defRPr cap="all"/>
           </a:pPr>
           <a:r>
-            <a:rPr lang="en-US" sz="1200" kern="1200"/>
+            <a:rPr lang="en-US" sz="1100" kern="1200" dirty="0"/>
             <a:t>Scoring</a:t>
           </a:r>
         </a:p>
@@ -12194,7 +12255,7 @@
           <a:p>
             <a:fld id="{1E1424D9-C7CE-2541-A6C2-DAFF94EE61B9}" type="datetimeFigureOut">
               <a:rPr lang="en-US" smtClean="0"/>
-              <a:t>4/18/20</a:t>
+              <a:t>5/30/20</a:t>
             </a:fld>
             <a:endParaRPr lang="en-US"/>
           </a:p>
@@ -12785,7 +12846,7 @@
           <a:p>
             <a:fld id="{02AC24A9-CCB6-4F8D-B8DB-C2F3692CFA5A}" type="datetimeFigureOut">
               <a:rPr lang="en-US" smtClean="0"/>
-              <a:t>4/18/20</a:t>
+              <a:t>5/30/20</a:t>
             </a:fld>
             <a:endParaRPr lang="en-US" dirty="0"/>
           </a:p>
@@ -13155,7 +13216,7 @@
           <a:p>
             <a:fld id="{02AC24A9-CCB6-4F8D-B8DB-C2F3692CFA5A}" type="datetimeFigureOut">
               <a:rPr lang="en-US" smtClean="0"/>
-              <a:t>4/18/20</a:t>
+              <a:t>5/30/20</a:t>
             </a:fld>
             <a:endParaRPr lang="en-US"/>
           </a:p>
@@ -13364,7 +13425,7 @@
           <a:p>
             <a:fld id="{02AC24A9-CCB6-4F8D-B8DB-C2F3692CFA5A}" type="datetimeFigureOut">
               <a:rPr lang="en-US" smtClean="0"/>
-              <a:t>4/18/20</a:t>
+              <a:t>5/30/20</a:t>
             </a:fld>
             <a:endParaRPr lang="en-US"/>
           </a:p>
@@ -13834,7 +13895,7 @@
           <a:p>
             <a:fld id="{02AC24A9-CCB6-4F8D-B8DB-C2F3692CFA5A}" type="datetimeFigureOut">
               <a:rPr lang="en-US" smtClean="0"/>
-              <a:t>4/18/20</a:t>
+              <a:t>5/30/20</a:t>
             </a:fld>
             <a:endParaRPr lang="en-US"/>
           </a:p>
@@ -14288,7 +14349,7 @@
           <a:p>
             <a:fld id="{02AC24A9-CCB6-4F8D-B8DB-C2F3692CFA5A}" type="datetimeFigureOut">
               <a:rPr lang="en-US" smtClean="0"/>
-              <a:t>4/18/20</a:t>
+              <a:t>5/30/20</a:t>
             </a:fld>
             <a:endParaRPr lang="en-US"/>
           </a:p>
@@ -14820,7 +14881,7 @@
           <a:p>
             <a:fld id="{02AC24A9-CCB6-4F8D-B8DB-C2F3692CFA5A}" type="datetimeFigureOut">
               <a:rPr lang="en-US" smtClean="0"/>
-              <a:t>4/18/20</a:t>
+              <a:t>5/30/20</a:t>
             </a:fld>
             <a:endParaRPr lang="en-US"/>
           </a:p>
@@ -15519,7 +15580,7 @@
           <a:p>
             <a:fld id="{02AC24A9-CCB6-4F8D-B8DB-C2F3692CFA5A}" type="datetimeFigureOut">
               <a:rPr lang="en-US" smtClean="0"/>
-              <a:t>4/18/20</a:t>
+              <a:t>5/30/20</a:t>
             </a:fld>
             <a:endParaRPr lang="en-US"/>
           </a:p>
@@ -15848,7 +15909,7 @@
           <a:p>
             <a:fld id="{02AC24A9-CCB6-4F8D-B8DB-C2F3692CFA5A}" type="datetimeFigureOut">
               <a:rPr lang="en-US" smtClean="0"/>
-              <a:t>4/18/20</a:t>
+              <a:t>5/30/20</a:t>
             </a:fld>
             <a:endParaRPr lang="en-US"/>
           </a:p>
@@ -15961,7 +16022,7 @@
           <a:p>
             <a:fld id="{02AC24A9-CCB6-4F8D-B8DB-C2F3692CFA5A}" type="datetimeFigureOut">
               <a:rPr lang="en-US" smtClean="0"/>
-              <a:t>4/18/20</a:t>
+              <a:t>5/30/20</a:t>
             </a:fld>
             <a:endParaRPr lang="en-US"/>
           </a:p>
@@ -16456,7 +16517,7 @@
           <a:p>
             <a:fld id="{02AC24A9-CCB6-4F8D-B8DB-C2F3692CFA5A}" type="datetimeFigureOut">
               <a:rPr lang="en-US" smtClean="0"/>
-              <a:t>4/18/20</a:t>
+              <a:t>5/30/20</a:t>
             </a:fld>
             <a:endParaRPr lang="en-US" dirty="0"/>
           </a:p>
@@ -16933,7 +16994,7 @@
           <a:p>
             <a:fld id="{02AC24A9-CCB6-4F8D-B8DB-C2F3692CFA5A}" type="datetimeFigureOut">
               <a:rPr lang="en-US" smtClean="0"/>
-              <a:t>4/18/20</a:t>
+              <a:t>5/30/20</a:t>
             </a:fld>
             <a:endParaRPr lang="en-US"/>
           </a:p>
@@ -17176,7 +17237,7 @@
           <a:p>
             <a:fld id="{02AC24A9-CCB6-4F8D-B8DB-C2F3692CFA5A}" type="datetimeFigureOut">
               <a:rPr lang="en-US" smtClean="0"/>
-              <a:t>4/18/20</a:t>
+              <a:t>5/30/20</a:t>
             </a:fld>
             <a:endParaRPr lang="en-US"/>
           </a:p>
@@ -19659,7 +19720,7 @@
             <p:ph idx="1"/>
             <p:extLst>
               <p:ext uri="{D42A27DB-BD31-4B8C-83A1-F6EECF244321}">
-                <p14:modId xmlns:p14="http://schemas.microsoft.com/office/powerpoint/2010/main" val="2556193706"/>
+                <p14:modId xmlns:p14="http://schemas.microsoft.com/office/powerpoint/2010/main" val="1296670217"/>
               </p:ext>
             </p:extLst>
           </p:nvPr>
@@ -19688,8 +19749,8 @@
         </p:nvSpPr>
         <p:spPr>
           <a:xfrm>
-            <a:off x="4972050" y="2295252"/>
-            <a:ext cx="6372606" cy="3348882"/>
+            <a:off x="2638097" y="2426129"/>
+            <a:ext cx="8706559" cy="3348882"/>
           </a:xfrm>
           <a:prstGeom prst="frame">
             <a:avLst/>
@@ -23094,6 +23155,1545 @@
     <p:extLst>
       <p:ext uri="{BB962C8B-B14F-4D97-AF65-F5344CB8AC3E}">
         <p14:creationId xmlns:p14="http://schemas.microsoft.com/office/powerpoint/2010/main" val="851755332"/>
+      </p:ext>
+    </p:extLst>
+  </p:cSld>
+  <p:clrMapOvr>
+    <a:masterClrMapping/>
+  </p:clrMapOvr>
+</p:sld>
+</file>
+
+<file path=ppt/slides/slide9.xml><?xml version="1.0" encoding="utf-8"?>
+<p:sld xmlns:a="http://schemas.openxmlformats.org/drawingml/2006/main" xmlns:r="http://schemas.openxmlformats.org/officeDocument/2006/relationships" xmlns:p="http://schemas.openxmlformats.org/presentationml/2006/main">
+  <p:cSld>
+    <p:spTree>
+      <p:nvGrpSpPr>
+        <p:cNvPr id="1" name=""/>
+        <p:cNvGrpSpPr/>
+        <p:nvPr/>
+      </p:nvGrpSpPr>
+      <p:grpSpPr>
+        <a:xfrm>
+          <a:off x="0" y="0"/>
+          <a:ext cx="0" cy="0"/>
+          <a:chOff x="0" y="0"/>
+          <a:chExt cx="0" cy="0"/>
+        </a:xfrm>
+      </p:grpSpPr>
+      <p:sp>
+        <p:nvSpPr>
+          <p:cNvPr id="15" name="Round Diagonal Corner Rectangle 14">
+            <a:extLst>
+              <a:ext uri="{FF2B5EF4-FFF2-40B4-BE49-F238E27FC236}">
+                <a16:creationId xmlns:a16="http://schemas.microsoft.com/office/drawing/2014/main" id="{B33790B8-510F-E54A-B2B8-9952E10DBB3C}"/>
+              </a:ext>
+            </a:extLst>
+          </p:cNvPr>
+          <p:cNvSpPr/>
+          <p:nvPr/>
+        </p:nvSpPr>
+        <p:spPr>
+          <a:xfrm>
+            <a:off x="4448236" y="3239465"/>
+            <a:ext cx="2549971" cy="1741650"/>
+          </a:xfrm>
+          <a:prstGeom prst="round2DiagRect">
+            <a:avLst>
+              <a:gd name="adj1" fmla="val 29727"/>
+              <a:gd name="adj2" fmla="val 0"/>
+            </a:avLst>
+          </a:prstGeom>
+        </p:spPr>
+        <p:style>
+          <a:lnRef idx="0">
+            <a:schemeClr val="lt1">
+              <a:alpha val="0"/>
+              <a:hueOff val="0"/>
+              <a:satOff val="0"/>
+              <a:lumOff val="0"/>
+              <a:alphaOff val="0"/>
+            </a:schemeClr>
+          </a:lnRef>
+          <a:fillRef idx="1">
+            <a:schemeClr val="accent2">
+              <a:hueOff val="0"/>
+              <a:satOff val="0"/>
+              <a:lumOff val="0"/>
+              <a:alphaOff val="0"/>
+            </a:schemeClr>
+          </a:fillRef>
+          <a:effectRef idx="0">
+            <a:schemeClr val="accent2">
+              <a:hueOff val="0"/>
+              <a:satOff val="0"/>
+              <a:lumOff val="0"/>
+              <a:alphaOff val="0"/>
+            </a:schemeClr>
+          </a:effectRef>
+          <a:fontRef idx="minor"/>
+        </p:style>
+      </p:sp>
+      <p:sp>
+        <p:nvSpPr>
+          <p:cNvPr id="6" name="Right Arrow 5">
+            <a:extLst>
+              <a:ext uri="{FF2B5EF4-FFF2-40B4-BE49-F238E27FC236}">
+                <a16:creationId xmlns:a16="http://schemas.microsoft.com/office/drawing/2014/main" id="{34A06B27-0BE8-2544-A1BA-2BC8C4615A0E}"/>
+              </a:ext>
+            </a:extLst>
+          </p:cNvPr>
+          <p:cNvSpPr/>
+          <p:nvPr/>
+        </p:nvSpPr>
+        <p:spPr>
+          <a:xfrm>
+            <a:off x="3736372" y="3962629"/>
+            <a:ext cx="625463" cy="103772"/>
+          </a:xfrm>
+          <a:prstGeom prst="rightArrow">
+            <a:avLst/>
+          </a:prstGeom>
+        </p:spPr>
+        <p:style>
+          <a:lnRef idx="2">
+            <a:schemeClr val="accent1">
+              <a:shade val="50000"/>
+            </a:schemeClr>
+          </a:lnRef>
+          <a:fillRef idx="1">
+            <a:schemeClr val="accent1"/>
+          </a:fillRef>
+          <a:effectRef idx="0">
+            <a:schemeClr val="accent1"/>
+          </a:effectRef>
+          <a:fontRef idx="minor">
+            <a:schemeClr val="lt1"/>
+          </a:fontRef>
+        </p:style>
+        <p:txBody>
+          <a:bodyPr rtlCol="0" anchor="ctr"/>
+          <a:lstStyle/>
+          <a:p>
+            <a:pPr algn="ctr"/>
+            <a:endParaRPr lang="en-US"/>
+          </a:p>
+        </p:txBody>
+      </p:sp>
+      <p:sp>
+        <p:nvSpPr>
+          <p:cNvPr id="7" name="Right Arrow 6">
+            <a:extLst>
+              <a:ext uri="{FF2B5EF4-FFF2-40B4-BE49-F238E27FC236}">
+                <a16:creationId xmlns:a16="http://schemas.microsoft.com/office/drawing/2014/main" id="{0177EE3C-AA8C-D84C-8F09-F2595D10F4D6}"/>
+              </a:ext>
+            </a:extLst>
+          </p:cNvPr>
+          <p:cNvSpPr/>
+          <p:nvPr/>
+        </p:nvSpPr>
+        <p:spPr>
+          <a:xfrm>
+            <a:off x="1001569" y="3965731"/>
+            <a:ext cx="1218849" cy="111448"/>
+          </a:xfrm>
+          <a:prstGeom prst="rightArrow">
+            <a:avLst/>
+          </a:prstGeom>
+        </p:spPr>
+        <p:style>
+          <a:lnRef idx="2">
+            <a:schemeClr val="accent1">
+              <a:shade val="50000"/>
+            </a:schemeClr>
+          </a:lnRef>
+          <a:fillRef idx="1">
+            <a:schemeClr val="accent1"/>
+          </a:fillRef>
+          <a:effectRef idx="0">
+            <a:schemeClr val="accent1"/>
+          </a:effectRef>
+          <a:fontRef idx="minor">
+            <a:schemeClr val="lt1"/>
+          </a:fontRef>
+        </p:style>
+        <p:txBody>
+          <a:bodyPr rtlCol="0" anchor="ctr"/>
+          <a:lstStyle/>
+          <a:p>
+            <a:pPr algn="ctr"/>
+            <a:endParaRPr lang="en-US"/>
+          </a:p>
+        </p:txBody>
+      </p:sp>
+      <p:sp>
+        <p:nvSpPr>
+          <p:cNvPr id="8" name="Right Arrow 7">
+            <a:extLst>
+              <a:ext uri="{FF2B5EF4-FFF2-40B4-BE49-F238E27FC236}">
+                <a16:creationId xmlns:a16="http://schemas.microsoft.com/office/drawing/2014/main" id="{7DCE549D-B59E-6744-9BD1-06E848631AC9}"/>
+              </a:ext>
+            </a:extLst>
+          </p:cNvPr>
+          <p:cNvSpPr/>
+          <p:nvPr/>
+        </p:nvSpPr>
+        <p:spPr>
+          <a:xfrm>
+            <a:off x="9374682" y="3909307"/>
+            <a:ext cx="688009" cy="103772"/>
+          </a:xfrm>
+          <a:prstGeom prst="rightArrow">
+            <a:avLst/>
+          </a:prstGeom>
+        </p:spPr>
+        <p:style>
+          <a:lnRef idx="2">
+            <a:schemeClr val="accent1">
+              <a:shade val="50000"/>
+            </a:schemeClr>
+          </a:lnRef>
+          <a:fillRef idx="1">
+            <a:schemeClr val="accent1"/>
+          </a:fillRef>
+          <a:effectRef idx="0">
+            <a:schemeClr val="accent1"/>
+          </a:effectRef>
+          <a:fontRef idx="minor">
+            <a:schemeClr val="lt1"/>
+          </a:fontRef>
+        </p:style>
+        <p:txBody>
+          <a:bodyPr rtlCol="0" anchor="ctr"/>
+          <a:lstStyle/>
+          <a:p>
+            <a:pPr algn="ctr"/>
+            <a:endParaRPr lang="en-US"/>
+          </a:p>
+        </p:txBody>
+      </p:sp>
+      <p:sp>
+        <p:nvSpPr>
+          <p:cNvPr id="9" name="Right Arrow 8">
+            <a:extLst>
+              <a:ext uri="{FF2B5EF4-FFF2-40B4-BE49-F238E27FC236}">
+                <a16:creationId xmlns:a16="http://schemas.microsoft.com/office/drawing/2014/main" id="{62AF4BA9-165A-BB44-A70B-95D704A45E37}"/>
+              </a:ext>
+            </a:extLst>
+          </p:cNvPr>
+          <p:cNvSpPr/>
+          <p:nvPr/>
+        </p:nvSpPr>
+        <p:spPr>
+          <a:xfrm>
+            <a:off x="7047212" y="3927132"/>
+            <a:ext cx="688009" cy="103772"/>
+          </a:xfrm>
+          <a:prstGeom prst="rightArrow">
+            <a:avLst/>
+          </a:prstGeom>
+        </p:spPr>
+        <p:style>
+          <a:lnRef idx="2">
+            <a:schemeClr val="accent1">
+              <a:shade val="50000"/>
+            </a:schemeClr>
+          </a:lnRef>
+          <a:fillRef idx="1">
+            <a:schemeClr val="accent1"/>
+          </a:fillRef>
+          <a:effectRef idx="0">
+            <a:schemeClr val="accent1"/>
+          </a:effectRef>
+          <a:fontRef idx="minor">
+            <a:schemeClr val="lt1"/>
+          </a:fontRef>
+        </p:style>
+        <p:txBody>
+          <a:bodyPr rtlCol="0" anchor="ctr"/>
+          <a:lstStyle/>
+          <a:p>
+            <a:pPr algn="ctr"/>
+            <a:endParaRPr lang="en-US"/>
+          </a:p>
+        </p:txBody>
+      </p:sp>
+      <p:pic>
+        <p:nvPicPr>
+          <p:cNvPr id="10" name="Picture 9">
+            <a:hlinkHover r:id="" action="ppaction://noaction" highlightClick="1"/>
+            <a:extLst>
+              <a:ext uri="{FF2B5EF4-FFF2-40B4-BE49-F238E27FC236}">
+                <a16:creationId xmlns:a16="http://schemas.microsoft.com/office/drawing/2014/main" id="{2F216750-AFF8-DD40-9582-B039CC80A101}"/>
+              </a:ext>
+            </a:extLst>
+          </p:cNvPr>
+          <p:cNvPicPr>
+            <a:picLocks noChangeAspect="1"/>
+          </p:cNvPicPr>
+          <p:nvPr/>
+        </p:nvPicPr>
+        <p:blipFill>
+          <a:blip r:embed="rId2"/>
+          <a:stretch>
+            <a:fillRect/>
+          </a:stretch>
+        </p:blipFill>
+        <p:spPr>
+          <a:xfrm>
+            <a:off x="76539" y="3600874"/>
+            <a:ext cx="938580" cy="699370"/>
+          </a:xfrm>
+          <a:prstGeom prst="rect">
+            <a:avLst/>
+          </a:prstGeom>
+        </p:spPr>
+      </p:pic>
+      <p:sp>
+        <p:nvSpPr>
+          <p:cNvPr id="11" name="Round Diagonal Corner Rectangle 10">
+            <a:extLst>
+              <a:ext uri="{FF2B5EF4-FFF2-40B4-BE49-F238E27FC236}">
+                <a16:creationId xmlns:a16="http://schemas.microsoft.com/office/drawing/2014/main" id="{E0E2E191-1326-4846-ACD7-55E86C905105}"/>
+              </a:ext>
+            </a:extLst>
+          </p:cNvPr>
+          <p:cNvSpPr/>
+          <p:nvPr/>
+        </p:nvSpPr>
+        <p:spPr>
+          <a:xfrm>
+            <a:off x="2387794" y="3429000"/>
+            <a:ext cx="1247083" cy="1094643"/>
+          </a:xfrm>
+          <a:prstGeom prst="round2DiagRect">
+            <a:avLst>
+              <a:gd name="adj1" fmla="val 29727"/>
+              <a:gd name="adj2" fmla="val 0"/>
+            </a:avLst>
+          </a:prstGeom>
+        </p:spPr>
+        <p:style>
+          <a:lnRef idx="0">
+            <a:schemeClr val="lt1">
+              <a:alpha val="0"/>
+              <a:hueOff val="0"/>
+              <a:satOff val="0"/>
+              <a:lumOff val="0"/>
+              <a:alphaOff val="0"/>
+            </a:schemeClr>
+          </a:lnRef>
+          <a:fillRef idx="1">
+            <a:schemeClr val="accent2">
+              <a:hueOff val="0"/>
+              <a:satOff val="0"/>
+              <a:lumOff val="0"/>
+              <a:alphaOff val="0"/>
+            </a:schemeClr>
+          </a:fillRef>
+          <a:effectRef idx="0">
+            <a:schemeClr val="accent2">
+              <a:hueOff val="0"/>
+              <a:satOff val="0"/>
+              <a:lumOff val="0"/>
+              <a:alphaOff val="0"/>
+            </a:schemeClr>
+          </a:effectRef>
+          <a:fontRef idx="minor"/>
+        </p:style>
+      </p:sp>
+      <p:pic>
+        <p:nvPicPr>
+          <p:cNvPr id="14" name="Picture 13">
+            <a:extLst>
+              <a:ext uri="{FF2B5EF4-FFF2-40B4-BE49-F238E27FC236}">
+                <a16:creationId xmlns:a16="http://schemas.microsoft.com/office/drawing/2014/main" id="{65BF6887-E4EB-084B-95CC-820BDAAF3CB8}"/>
+              </a:ext>
+            </a:extLst>
+          </p:cNvPr>
+          <p:cNvPicPr>
+            <a:picLocks noChangeAspect="1"/>
+          </p:cNvPicPr>
+          <p:nvPr/>
+        </p:nvPicPr>
+        <p:blipFill>
+          <a:blip r:embed="rId3"/>
+          <a:stretch>
+            <a:fillRect/>
+          </a:stretch>
+        </p:blipFill>
+        <p:spPr>
+          <a:xfrm>
+            <a:off x="2499529" y="3762225"/>
+            <a:ext cx="1023614" cy="428195"/>
+          </a:xfrm>
+          <a:prstGeom prst="rect">
+            <a:avLst/>
+          </a:prstGeom>
+        </p:spPr>
+      </p:pic>
+      <p:pic>
+        <p:nvPicPr>
+          <p:cNvPr id="16" name="Picture 15">
+            <a:extLst>
+              <a:ext uri="{FF2B5EF4-FFF2-40B4-BE49-F238E27FC236}">
+                <a16:creationId xmlns:a16="http://schemas.microsoft.com/office/drawing/2014/main" id="{D73B7E35-47DE-A94C-B09D-0B3C1FBC91FC}"/>
+              </a:ext>
+            </a:extLst>
+          </p:cNvPr>
+          <p:cNvPicPr>
+            <a:picLocks noChangeAspect="1"/>
+          </p:cNvPicPr>
+          <p:nvPr/>
+        </p:nvPicPr>
+        <p:blipFill>
+          <a:blip r:embed="rId4"/>
+          <a:stretch>
+            <a:fillRect/>
+          </a:stretch>
+        </p:blipFill>
+        <p:spPr>
+          <a:xfrm>
+            <a:off x="4861767" y="3429876"/>
+            <a:ext cx="1668598" cy="593484"/>
+          </a:xfrm>
+          <a:prstGeom prst="rect">
+            <a:avLst/>
+          </a:prstGeom>
+        </p:spPr>
+      </p:pic>
+      <p:sp>
+        <p:nvSpPr>
+          <p:cNvPr id="23" name="TextBox 22">
+            <a:extLst>
+              <a:ext uri="{FF2B5EF4-FFF2-40B4-BE49-F238E27FC236}">
+                <a16:creationId xmlns:a16="http://schemas.microsoft.com/office/drawing/2014/main" id="{8E7A7763-6941-7748-B480-968CA4358C23}"/>
+              </a:ext>
+            </a:extLst>
+          </p:cNvPr>
+          <p:cNvSpPr txBox="1"/>
+          <p:nvPr/>
+        </p:nvSpPr>
+        <p:spPr>
+          <a:xfrm>
+            <a:off x="2278135" y="4627720"/>
+            <a:ext cx="1488867" cy="595546"/>
+          </a:xfrm>
+          <a:prstGeom prst="rect">
+            <a:avLst/>
+          </a:prstGeom>
+        </p:spPr>
+        <p:style>
+          <a:lnRef idx="0">
+            <a:scrgbClr r="0" g="0" b="0"/>
+          </a:lnRef>
+          <a:fillRef idx="0">
+            <a:scrgbClr r="0" g="0" b="0"/>
+          </a:fillRef>
+          <a:effectRef idx="0">
+            <a:scrgbClr r="0" g="0" b="0"/>
+          </a:effectRef>
+          <a:fontRef idx="minor">
+            <a:schemeClr val="tx1">
+              <a:hueOff val="0"/>
+              <a:satOff val="0"/>
+              <a:lumOff val="0"/>
+              <a:alphaOff val="0"/>
+            </a:schemeClr>
+          </a:fontRef>
+        </p:style>
+        <p:txBody>
+          <a:bodyPr spcFirstLastPara="0" vert="horz" wrap="square" lIns="0" tIns="0" rIns="0" bIns="0" numCol="1" spcCol="1270" anchor="t" anchorCtr="0">
+            <a:noAutofit/>
+          </a:bodyPr>
+          <a:lstStyle/>
+          <a:p>
+            <a:pPr marL="0" lvl="0" indent="0" algn="ctr" defTabSz="533400">
+              <a:lnSpc>
+                <a:spcPct val="90000"/>
+              </a:lnSpc>
+              <a:spcBef>
+                <a:spcPct val="0"/>
+              </a:spcBef>
+              <a:spcAft>
+                <a:spcPct val="35000"/>
+              </a:spcAft>
+              <a:buNone/>
+              <a:defRPr cap="all"/>
+            </a:pPr>
+            <a:r>
+              <a:rPr lang="en-US" sz="1200" kern="1200" dirty="0"/>
+              <a:t>Kafka Broker</a:t>
+            </a:r>
+          </a:p>
+        </p:txBody>
+      </p:sp>
+      <p:pic>
+        <p:nvPicPr>
+          <p:cNvPr id="32" name="Picture 31">
+            <a:extLst>
+              <a:ext uri="{FF2B5EF4-FFF2-40B4-BE49-F238E27FC236}">
+                <a16:creationId xmlns:a16="http://schemas.microsoft.com/office/drawing/2014/main" id="{2A5CF6A7-A2E8-0544-9005-ED0C9718B6A4}"/>
+              </a:ext>
+            </a:extLst>
+          </p:cNvPr>
+          <p:cNvPicPr>
+            <a:picLocks noChangeAspect="1"/>
+          </p:cNvPicPr>
+          <p:nvPr/>
+        </p:nvPicPr>
+        <p:blipFill>
+          <a:blip r:embed="rId5"/>
+          <a:stretch>
+            <a:fillRect/>
+          </a:stretch>
+        </p:blipFill>
+        <p:spPr>
+          <a:xfrm>
+            <a:off x="62990" y="2275982"/>
+            <a:ext cx="938579" cy="810776"/>
+          </a:xfrm>
+          <a:prstGeom prst="rect">
+            <a:avLst/>
+          </a:prstGeom>
+        </p:spPr>
+      </p:pic>
+      <p:pic>
+        <p:nvPicPr>
+          <p:cNvPr id="34" name="Graphic 33" descr="Database">
+            <a:extLst>
+              <a:ext uri="{FF2B5EF4-FFF2-40B4-BE49-F238E27FC236}">
+                <a16:creationId xmlns:a16="http://schemas.microsoft.com/office/drawing/2014/main" id="{024D403B-F5C2-5B46-BD74-4E791CACADEB}"/>
+              </a:ext>
+            </a:extLst>
+          </p:cNvPr>
+          <p:cNvPicPr>
+            <a:picLocks noChangeAspect="1"/>
+          </p:cNvPicPr>
+          <p:nvPr/>
+        </p:nvPicPr>
+        <p:blipFill>
+          <a:blip r:embed="rId6">
+            <a:extLst>
+              <a:ext uri="{96DAC541-7B7A-43D3-8B79-37D633B846F1}">
+                <asvg:svgBlip xmlns:asvg="http://schemas.microsoft.com/office/drawing/2016/SVG/main" r:embed="rId7"/>
+              </a:ext>
+            </a:extLst>
+          </a:blip>
+          <a:stretch>
+            <a:fillRect/>
+          </a:stretch>
+        </p:blipFill>
+        <p:spPr>
+          <a:xfrm>
+            <a:off x="100719" y="4665101"/>
+            <a:ext cx="914400" cy="914400"/>
+          </a:xfrm>
+          <a:prstGeom prst="rect">
+            <a:avLst/>
+          </a:prstGeom>
+        </p:spPr>
+      </p:pic>
+      <p:sp>
+        <p:nvSpPr>
+          <p:cNvPr id="35" name="Right Arrow 34">
+            <a:extLst>
+              <a:ext uri="{FF2B5EF4-FFF2-40B4-BE49-F238E27FC236}">
+                <a16:creationId xmlns:a16="http://schemas.microsoft.com/office/drawing/2014/main" id="{D5236113-0FCC-DE4D-92B2-E86270595175}"/>
+              </a:ext>
+            </a:extLst>
+          </p:cNvPr>
+          <p:cNvSpPr/>
+          <p:nvPr/>
+        </p:nvSpPr>
+        <p:spPr>
+          <a:xfrm rot="19800000">
+            <a:off x="974738" y="4750721"/>
+            <a:ext cx="1218849" cy="111448"/>
+          </a:xfrm>
+          <a:prstGeom prst="rightArrow">
+            <a:avLst/>
+          </a:prstGeom>
+        </p:spPr>
+        <p:style>
+          <a:lnRef idx="2">
+            <a:schemeClr val="accent1">
+              <a:shade val="50000"/>
+            </a:schemeClr>
+          </a:lnRef>
+          <a:fillRef idx="1">
+            <a:schemeClr val="accent1"/>
+          </a:fillRef>
+          <a:effectRef idx="0">
+            <a:schemeClr val="accent1"/>
+          </a:effectRef>
+          <a:fontRef idx="minor">
+            <a:schemeClr val="lt1"/>
+          </a:fontRef>
+        </p:style>
+        <p:txBody>
+          <a:bodyPr rtlCol="0" anchor="ctr"/>
+          <a:lstStyle/>
+          <a:p>
+            <a:pPr algn="ctr"/>
+            <a:endParaRPr lang="en-US"/>
+          </a:p>
+        </p:txBody>
+      </p:sp>
+      <p:sp>
+        <p:nvSpPr>
+          <p:cNvPr id="36" name="Right Arrow 35">
+            <a:extLst>
+              <a:ext uri="{FF2B5EF4-FFF2-40B4-BE49-F238E27FC236}">
+                <a16:creationId xmlns:a16="http://schemas.microsoft.com/office/drawing/2014/main" id="{0D09EAEB-832D-174A-A993-9DBE3550CBB4}"/>
+              </a:ext>
+            </a:extLst>
+          </p:cNvPr>
+          <p:cNvSpPr/>
+          <p:nvPr/>
+        </p:nvSpPr>
+        <p:spPr>
+          <a:xfrm rot="1800000">
+            <a:off x="1001568" y="3190194"/>
+            <a:ext cx="1218849" cy="101316"/>
+          </a:xfrm>
+          <a:prstGeom prst="rightArrow">
+            <a:avLst/>
+          </a:prstGeom>
+        </p:spPr>
+        <p:style>
+          <a:lnRef idx="2">
+            <a:schemeClr val="accent1">
+              <a:shade val="50000"/>
+            </a:schemeClr>
+          </a:lnRef>
+          <a:fillRef idx="1">
+            <a:schemeClr val="accent1"/>
+          </a:fillRef>
+          <a:effectRef idx="0">
+            <a:schemeClr val="accent1"/>
+          </a:effectRef>
+          <a:fontRef idx="minor">
+            <a:schemeClr val="lt1"/>
+          </a:fontRef>
+        </p:style>
+        <p:txBody>
+          <a:bodyPr rtlCol="0" anchor="ctr"/>
+          <a:lstStyle/>
+          <a:p>
+            <a:pPr algn="ctr"/>
+            <a:endParaRPr lang="en-US"/>
+          </a:p>
+        </p:txBody>
+      </p:sp>
+      <p:sp>
+        <p:nvSpPr>
+          <p:cNvPr id="37" name="TextBox 36">
+            <a:extLst>
+              <a:ext uri="{FF2B5EF4-FFF2-40B4-BE49-F238E27FC236}">
+                <a16:creationId xmlns:a16="http://schemas.microsoft.com/office/drawing/2014/main" id="{55C68F3B-E2F2-4843-887F-19DBF37F45B2}"/>
+              </a:ext>
+            </a:extLst>
+          </p:cNvPr>
+          <p:cNvSpPr txBox="1"/>
+          <p:nvPr/>
+        </p:nvSpPr>
+        <p:spPr>
+          <a:xfrm>
+            <a:off x="4787716" y="4232287"/>
+            <a:ext cx="894233" cy="374832"/>
+          </a:xfrm>
+          <a:prstGeom prst="rect">
+            <a:avLst/>
+          </a:prstGeom>
+        </p:spPr>
+        <p:style>
+          <a:lnRef idx="0">
+            <a:scrgbClr r="0" g="0" b="0"/>
+          </a:lnRef>
+          <a:fillRef idx="0">
+            <a:scrgbClr r="0" g="0" b="0"/>
+          </a:fillRef>
+          <a:effectRef idx="0">
+            <a:scrgbClr r="0" g="0" b="0"/>
+          </a:effectRef>
+          <a:fontRef idx="minor">
+            <a:schemeClr val="tx1">
+              <a:hueOff val="0"/>
+              <a:satOff val="0"/>
+              <a:lumOff val="0"/>
+              <a:alphaOff val="0"/>
+            </a:schemeClr>
+          </a:fontRef>
+        </p:style>
+        <p:txBody>
+          <a:bodyPr spcFirstLastPara="0" vert="horz" wrap="square" lIns="0" tIns="0" rIns="0" bIns="0" numCol="1" spcCol="1270" anchor="t" anchorCtr="0">
+            <a:noAutofit/>
+          </a:bodyPr>
+          <a:lstStyle/>
+          <a:p>
+            <a:pPr marL="0" lvl="0" indent="0" defTabSz="533400">
+              <a:lnSpc>
+                <a:spcPct val="90000"/>
+              </a:lnSpc>
+              <a:spcBef>
+                <a:spcPct val="0"/>
+              </a:spcBef>
+              <a:spcAft>
+                <a:spcPct val="35000"/>
+              </a:spcAft>
+              <a:buNone/>
+              <a:defRPr cap="all"/>
+            </a:pPr>
+            <a:r>
+              <a:rPr lang="en-US" sz="1200" kern="1200" dirty="0">
+                <a:solidFill>
+                  <a:schemeClr val="bg1"/>
+                </a:solidFill>
+              </a:rPr>
+              <a:t>NRC Lexicon</a:t>
+            </a:r>
+          </a:p>
+        </p:txBody>
+      </p:sp>
+      <p:pic>
+        <p:nvPicPr>
+          <p:cNvPr id="38" name="Picture 37">
+            <a:extLst>
+              <a:ext uri="{FF2B5EF4-FFF2-40B4-BE49-F238E27FC236}">
+                <a16:creationId xmlns:a16="http://schemas.microsoft.com/office/drawing/2014/main" id="{A012232F-725D-E44A-B352-FB7F082B1379}"/>
+              </a:ext>
+            </a:extLst>
+          </p:cNvPr>
+          <p:cNvPicPr>
+            <a:picLocks noChangeAspect="1"/>
+          </p:cNvPicPr>
+          <p:nvPr/>
+        </p:nvPicPr>
+        <p:blipFill>
+          <a:blip r:embed="rId8"/>
+          <a:stretch>
+            <a:fillRect/>
+          </a:stretch>
+        </p:blipFill>
+        <p:spPr>
+          <a:xfrm>
+            <a:off x="7808167" y="3613995"/>
+            <a:ext cx="1465339" cy="686250"/>
+          </a:xfrm>
+          <a:prstGeom prst="rect">
+            <a:avLst/>
+          </a:prstGeom>
+          <a:ln>
+            <a:solidFill>
+              <a:schemeClr val="accent1"/>
+            </a:solidFill>
+          </a:ln>
+        </p:spPr>
+      </p:pic>
+      <p:pic>
+        <p:nvPicPr>
+          <p:cNvPr id="39" name="Picture 38">
+            <a:extLst>
+              <a:ext uri="{FF2B5EF4-FFF2-40B4-BE49-F238E27FC236}">
+                <a16:creationId xmlns:a16="http://schemas.microsoft.com/office/drawing/2014/main" id="{3F40D43D-D51D-234B-958C-2B30E5A77609}"/>
+              </a:ext>
+            </a:extLst>
+          </p:cNvPr>
+          <p:cNvPicPr>
+            <a:picLocks noChangeAspect="1"/>
+          </p:cNvPicPr>
+          <p:nvPr/>
+        </p:nvPicPr>
+        <p:blipFill>
+          <a:blip r:embed="rId9"/>
+          <a:stretch>
+            <a:fillRect/>
+          </a:stretch>
+        </p:blipFill>
+        <p:spPr>
+          <a:xfrm>
+            <a:off x="10378336" y="3220341"/>
+            <a:ext cx="1362117" cy="560487"/>
+          </a:xfrm>
+          <a:prstGeom prst="rect">
+            <a:avLst/>
+          </a:prstGeom>
+          <a:ln>
+            <a:solidFill>
+              <a:schemeClr val="accent1"/>
+            </a:solidFill>
+          </a:ln>
+        </p:spPr>
+      </p:pic>
+      <p:sp>
+        <p:nvSpPr>
+          <p:cNvPr id="40" name="Title 1">
+            <a:extLst>
+              <a:ext uri="{FF2B5EF4-FFF2-40B4-BE49-F238E27FC236}">
+                <a16:creationId xmlns:a16="http://schemas.microsoft.com/office/drawing/2014/main" id="{E3572892-464B-4149-AA36-F08B1E8AF4D4}"/>
+              </a:ext>
+            </a:extLst>
+          </p:cNvPr>
+          <p:cNvSpPr>
+            <a:spLocks noGrp="1"/>
+          </p:cNvSpPr>
+          <p:nvPr>
+            <p:ph type="title"/>
+          </p:nvPr>
+        </p:nvSpPr>
+        <p:spPr>
+          <a:xfrm>
+            <a:off x="1115568" y="548640"/>
+            <a:ext cx="10168128" cy="1179576"/>
+          </a:xfrm>
+        </p:spPr>
+        <p:txBody>
+          <a:bodyPr/>
+          <a:lstStyle/>
+          <a:p>
+            <a:r>
+              <a:rPr lang="en-US" b="1" dirty="0"/>
+              <a:t>COVID19 - ANALYTICS PIPELINE</a:t>
+            </a:r>
+          </a:p>
+        </p:txBody>
+      </p:sp>
+      <p:sp>
+        <p:nvSpPr>
+          <p:cNvPr id="42" name="TextBox 41">
+            <a:extLst>
+              <a:ext uri="{FF2B5EF4-FFF2-40B4-BE49-F238E27FC236}">
+                <a16:creationId xmlns:a16="http://schemas.microsoft.com/office/drawing/2014/main" id="{CA5604B9-1C6C-EF46-829F-7FD095932071}"/>
+              </a:ext>
+            </a:extLst>
+          </p:cNvPr>
+          <p:cNvSpPr txBox="1"/>
+          <p:nvPr/>
+        </p:nvSpPr>
+        <p:spPr>
+          <a:xfrm>
+            <a:off x="7742152" y="4396451"/>
+            <a:ext cx="1488867" cy="595546"/>
+          </a:xfrm>
+          <a:prstGeom prst="rect">
+            <a:avLst/>
+          </a:prstGeom>
+        </p:spPr>
+        <p:style>
+          <a:lnRef idx="0">
+            <a:scrgbClr r="0" g="0" b="0"/>
+          </a:lnRef>
+          <a:fillRef idx="0">
+            <a:scrgbClr r="0" g="0" b="0"/>
+          </a:fillRef>
+          <a:effectRef idx="0">
+            <a:scrgbClr r="0" g="0" b="0"/>
+          </a:effectRef>
+          <a:fontRef idx="minor">
+            <a:schemeClr val="tx1">
+              <a:hueOff val="0"/>
+              <a:satOff val="0"/>
+              <a:lumOff val="0"/>
+              <a:alphaOff val="0"/>
+            </a:schemeClr>
+          </a:fontRef>
+        </p:style>
+        <p:txBody>
+          <a:bodyPr spcFirstLastPara="0" vert="horz" wrap="square" lIns="0" tIns="0" rIns="0" bIns="0" numCol="1" spcCol="1270" anchor="t" anchorCtr="0">
+            <a:noAutofit/>
+          </a:bodyPr>
+          <a:lstStyle/>
+          <a:p>
+            <a:pPr marL="0" lvl="0" indent="0" algn="ctr" defTabSz="533400">
+              <a:lnSpc>
+                <a:spcPct val="90000"/>
+              </a:lnSpc>
+              <a:spcBef>
+                <a:spcPct val="0"/>
+              </a:spcBef>
+              <a:spcAft>
+                <a:spcPct val="35000"/>
+              </a:spcAft>
+              <a:buNone/>
+              <a:defRPr cap="all"/>
+            </a:pPr>
+            <a:r>
+              <a:rPr lang="en-US" sz="1200" kern="1200" dirty="0"/>
+              <a:t>STORAGE</a:t>
+            </a:r>
+          </a:p>
+        </p:txBody>
+      </p:sp>
+      <p:sp>
+        <p:nvSpPr>
+          <p:cNvPr id="43" name="TextBox 42">
+            <a:extLst>
+              <a:ext uri="{FF2B5EF4-FFF2-40B4-BE49-F238E27FC236}">
+                <a16:creationId xmlns:a16="http://schemas.microsoft.com/office/drawing/2014/main" id="{1423EA00-DC9F-4D48-8D59-F9CCE56B9F1F}"/>
+              </a:ext>
+            </a:extLst>
+          </p:cNvPr>
+          <p:cNvSpPr txBox="1"/>
+          <p:nvPr/>
+        </p:nvSpPr>
+        <p:spPr>
+          <a:xfrm>
+            <a:off x="10323762" y="5208872"/>
+            <a:ext cx="1488867" cy="595546"/>
+          </a:xfrm>
+          <a:prstGeom prst="rect">
+            <a:avLst/>
+          </a:prstGeom>
+        </p:spPr>
+        <p:style>
+          <a:lnRef idx="0">
+            <a:scrgbClr r="0" g="0" b="0"/>
+          </a:lnRef>
+          <a:fillRef idx="0">
+            <a:scrgbClr r="0" g="0" b="0"/>
+          </a:fillRef>
+          <a:effectRef idx="0">
+            <a:scrgbClr r="0" g="0" b="0"/>
+          </a:effectRef>
+          <a:fontRef idx="minor">
+            <a:schemeClr val="tx1">
+              <a:hueOff val="0"/>
+              <a:satOff val="0"/>
+              <a:lumOff val="0"/>
+              <a:alphaOff val="0"/>
+            </a:schemeClr>
+          </a:fontRef>
+        </p:style>
+        <p:txBody>
+          <a:bodyPr spcFirstLastPara="0" vert="horz" wrap="square" lIns="0" tIns="0" rIns="0" bIns="0" numCol="1" spcCol="1270" anchor="t" anchorCtr="0">
+            <a:noAutofit/>
+          </a:bodyPr>
+          <a:lstStyle/>
+          <a:p>
+            <a:pPr marL="0" lvl="0" indent="0" algn="ctr" defTabSz="533400">
+              <a:lnSpc>
+                <a:spcPct val="90000"/>
+              </a:lnSpc>
+              <a:spcBef>
+                <a:spcPct val="0"/>
+              </a:spcBef>
+              <a:spcAft>
+                <a:spcPct val="35000"/>
+              </a:spcAft>
+              <a:buNone/>
+              <a:defRPr cap="all"/>
+            </a:pPr>
+            <a:r>
+              <a:rPr lang="en-US" sz="1200" kern="1200" dirty="0"/>
+              <a:t>VISUALIZATION</a:t>
+            </a:r>
+          </a:p>
+        </p:txBody>
+      </p:sp>
+      <p:sp>
+        <p:nvSpPr>
+          <p:cNvPr id="31" name="Rectangle 30" descr="Gears">
+            <a:extLst>
+              <a:ext uri="{FF2B5EF4-FFF2-40B4-BE49-F238E27FC236}">
+                <a16:creationId xmlns:a16="http://schemas.microsoft.com/office/drawing/2014/main" id="{AF5D4F30-C3F3-C84F-B55D-A2ACAA6C0C70}"/>
+              </a:ext>
+            </a:extLst>
+          </p:cNvPr>
+          <p:cNvSpPr/>
+          <p:nvPr/>
+        </p:nvSpPr>
+        <p:spPr>
+          <a:xfrm>
+            <a:off x="4422860" y="4185836"/>
+            <a:ext cx="406054" cy="467734"/>
+          </a:xfrm>
+          <a:prstGeom prst="rect">
+            <a:avLst/>
+          </a:prstGeom>
+          <a:blipFill>
+            <a:blip r:embed="rId10">
+              <a:extLst>
+                <a:ext uri="{28A0092B-C50C-407E-A947-70E740481C1C}">
+                  <a14:useLocalDpi xmlns:a14="http://schemas.microsoft.com/office/drawing/2010/main" val="0"/>
+                </a:ext>
+                <a:ext uri="{96DAC541-7B7A-43D3-8B79-37D633B846F1}">
+                  <asvg:svgBlip xmlns:asvg="http://schemas.microsoft.com/office/drawing/2016/SVG/main" r:embed="rId11"/>
+                </a:ext>
+              </a:extLst>
+            </a:blip>
+            <a:stretch>
+              <a:fillRect/>
+            </a:stretch>
+          </a:blipFill>
+          <a:ln>
+            <a:noFill/>
+          </a:ln>
+        </p:spPr>
+        <p:style>
+          <a:lnRef idx="2">
+            <a:scrgbClr r="0" g="0" b="0"/>
+          </a:lnRef>
+          <a:fillRef idx="1">
+            <a:scrgbClr r="0" g="0" b="0"/>
+          </a:fillRef>
+          <a:effectRef idx="0">
+            <a:schemeClr val="bg1">
+              <a:hueOff val="0"/>
+              <a:satOff val="0"/>
+              <a:lumOff val="0"/>
+              <a:alphaOff val="0"/>
+            </a:schemeClr>
+          </a:effectRef>
+          <a:fontRef idx="minor">
+            <a:schemeClr val="dk1">
+              <a:hueOff val="0"/>
+              <a:satOff val="0"/>
+              <a:lumOff val="0"/>
+              <a:alphaOff val="0"/>
+            </a:schemeClr>
+          </a:fontRef>
+        </p:style>
+        <p:txBody>
+          <a:bodyPr/>
+          <a:lstStyle/>
+          <a:p>
+            <a:endParaRPr lang="en-US" dirty="0"/>
+          </a:p>
+        </p:txBody>
+      </p:sp>
+      <p:sp>
+        <p:nvSpPr>
+          <p:cNvPr id="41" name="TextBox 40">
+            <a:extLst>
+              <a:ext uri="{FF2B5EF4-FFF2-40B4-BE49-F238E27FC236}">
+                <a16:creationId xmlns:a16="http://schemas.microsoft.com/office/drawing/2014/main" id="{F7C3B45B-1518-AB47-9C20-A3DED8964316}"/>
+              </a:ext>
+            </a:extLst>
+          </p:cNvPr>
+          <p:cNvSpPr txBox="1"/>
+          <p:nvPr/>
+        </p:nvSpPr>
+        <p:spPr>
+          <a:xfrm>
+            <a:off x="5657249" y="4193759"/>
+            <a:ext cx="1488867" cy="595546"/>
+          </a:xfrm>
+          <a:prstGeom prst="rect">
+            <a:avLst/>
+          </a:prstGeom>
+        </p:spPr>
+        <p:style>
+          <a:lnRef idx="0">
+            <a:scrgbClr r="0" g="0" b="0"/>
+          </a:lnRef>
+          <a:fillRef idx="0">
+            <a:scrgbClr r="0" g="0" b="0"/>
+          </a:fillRef>
+          <a:effectRef idx="0">
+            <a:scrgbClr r="0" g="0" b="0"/>
+          </a:effectRef>
+          <a:fontRef idx="minor">
+            <a:schemeClr val="tx1">
+              <a:hueOff val="0"/>
+              <a:satOff val="0"/>
+              <a:lumOff val="0"/>
+              <a:alphaOff val="0"/>
+            </a:schemeClr>
+          </a:fontRef>
+        </p:style>
+        <p:txBody>
+          <a:bodyPr spcFirstLastPara="0" vert="horz" wrap="square" lIns="0" tIns="0" rIns="0" bIns="0" numCol="1" spcCol="1270" anchor="t" anchorCtr="0">
+            <a:noAutofit/>
+          </a:bodyPr>
+          <a:lstStyle/>
+          <a:p>
+            <a:pPr marL="0" lvl="0" indent="0" algn="ctr" defTabSz="533400">
+              <a:lnSpc>
+                <a:spcPct val="90000"/>
+              </a:lnSpc>
+              <a:spcBef>
+                <a:spcPct val="0"/>
+              </a:spcBef>
+              <a:spcAft>
+                <a:spcPct val="35000"/>
+              </a:spcAft>
+              <a:buNone/>
+              <a:defRPr cap="all"/>
+            </a:pPr>
+            <a:r>
+              <a:rPr lang="en-US" sz="1200" dirty="0">
+                <a:solidFill>
+                  <a:schemeClr val="bg1"/>
+                </a:solidFill>
+              </a:rPr>
+              <a:t>Multi-variate timeseries analysis</a:t>
+            </a:r>
+            <a:endParaRPr lang="en-US" sz="1200" kern="1200" dirty="0">
+              <a:solidFill>
+                <a:schemeClr val="bg1"/>
+              </a:solidFill>
+            </a:endParaRPr>
+          </a:p>
+        </p:txBody>
+      </p:sp>
+      <p:sp>
+        <p:nvSpPr>
+          <p:cNvPr id="44" name="Rectangle 43" descr="Gears">
+            <a:extLst>
+              <a:ext uri="{FF2B5EF4-FFF2-40B4-BE49-F238E27FC236}">
+                <a16:creationId xmlns:a16="http://schemas.microsoft.com/office/drawing/2014/main" id="{87AF6F84-36CD-1043-A6CC-CE66DD6DBC0F}"/>
+              </a:ext>
+            </a:extLst>
+          </p:cNvPr>
+          <p:cNvSpPr/>
+          <p:nvPr/>
+        </p:nvSpPr>
+        <p:spPr>
+          <a:xfrm>
+            <a:off x="5469853" y="4159894"/>
+            <a:ext cx="406054" cy="467734"/>
+          </a:xfrm>
+          <a:prstGeom prst="rect">
+            <a:avLst/>
+          </a:prstGeom>
+          <a:blipFill>
+            <a:blip r:embed="rId10">
+              <a:extLst>
+                <a:ext uri="{28A0092B-C50C-407E-A947-70E740481C1C}">
+                  <a14:useLocalDpi xmlns:a14="http://schemas.microsoft.com/office/drawing/2010/main" val="0"/>
+                </a:ext>
+                <a:ext uri="{96DAC541-7B7A-43D3-8B79-37D633B846F1}">
+                  <asvg:svgBlip xmlns:asvg="http://schemas.microsoft.com/office/drawing/2016/SVG/main" r:embed="rId11"/>
+                </a:ext>
+              </a:extLst>
+            </a:blip>
+            <a:stretch>
+              <a:fillRect/>
+            </a:stretch>
+          </a:blipFill>
+          <a:ln>
+            <a:noFill/>
+          </a:ln>
+        </p:spPr>
+        <p:style>
+          <a:lnRef idx="2">
+            <a:scrgbClr r="0" g="0" b="0"/>
+          </a:lnRef>
+          <a:fillRef idx="1">
+            <a:scrgbClr r="0" g="0" b="0"/>
+          </a:fillRef>
+          <a:effectRef idx="0">
+            <a:schemeClr val="bg1">
+              <a:hueOff val="0"/>
+              <a:satOff val="0"/>
+              <a:lumOff val="0"/>
+              <a:alphaOff val="0"/>
+            </a:schemeClr>
+          </a:effectRef>
+          <a:fontRef idx="minor">
+            <a:schemeClr val="dk1">
+              <a:hueOff val="0"/>
+              <a:satOff val="0"/>
+              <a:lumOff val="0"/>
+              <a:alphaOff val="0"/>
+            </a:schemeClr>
+          </a:fontRef>
+        </p:style>
+        <p:txBody>
+          <a:bodyPr/>
+          <a:lstStyle/>
+          <a:p>
+            <a:endParaRPr lang="en-US" dirty="0"/>
+          </a:p>
+        </p:txBody>
+      </p:sp>
+      <p:sp>
+        <p:nvSpPr>
+          <p:cNvPr id="45" name="TextBox 44">
+            <a:extLst>
+              <a:ext uri="{FF2B5EF4-FFF2-40B4-BE49-F238E27FC236}">
+                <a16:creationId xmlns:a16="http://schemas.microsoft.com/office/drawing/2014/main" id="{97509BB7-2FED-5B47-8785-6504DDA30206}"/>
+              </a:ext>
+            </a:extLst>
+          </p:cNvPr>
+          <p:cNvSpPr txBox="1"/>
+          <p:nvPr/>
+        </p:nvSpPr>
+        <p:spPr>
+          <a:xfrm>
+            <a:off x="-89673" y="3091586"/>
+            <a:ext cx="1359434" cy="427258"/>
+          </a:xfrm>
+          <a:prstGeom prst="rect">
+            <a:avLst/>
+          </a:prstGeom>
+        </p:spPr>
+        <p:style>
+          <a:lnRef idx="0">
+            <a:scrgbClr r="0" g="0" b="0"/>
+          </a:lnRef>
+          <a:fillRef idx="0">
+            <a:scrgbClr r="0" g="0" b="0"/>
+          </a:fillRef>
+          <a:effectRef idx="0">
+            <a:scrgbClr r="0" g="0" b="0"/>
+          </a:effectRef>
+          <a:fontRef idx="minor">
+            <a:schemeClr val="tx1">
+              <a:hueOff val="0"/>
+              <a:satOff val="0"/>
+              <a:lumOff val="0"/>
+              <a:alphaOff val="0"/>
+            </a:schemeClr>
+          </a:fontRef>
+        </p:style>
+        <p:txBody>
+          <a:bodyPr spcFirstLastPara="0" vert="horz" wrap="square" lIns="0" tIns="0" rIns="0" bIns="0" numCol="1" spcCol="1270" anchor="t" anchorCtr="0">
+            <a:noAutofit/>
+          </a:bodyPr>
+          <a:lstStyle/>
+          <a:p>
+            <a:pPr algn="ctr" defTabSz="533400">
+              <a:lnSpc>
+                <a:spcPct val="90000"/>
+              </a:lnSpc>
+              <a:spcBef>
+                <a:spcPct val="0"/>
+              </a:spcBef>
+              <a:spcAft>
+                <a:spcPct val="35000"/>
+              </a:spcAft>
+              <a:defRPr cap="all"/>
+            </a:pPr>
+            <a:r>
+              <a:rPr lang="en-US" sz="1000" kern="1200" dirty="0"/>
+              <a:t>Structured </a:t>
+            </a:r>
+          </a:p>
+          <a:p>
+            <a:pPr algn="ctr" defTabSz="533400">
+              <a:lnSpc>
+                <a:spcPct val="90000"/>
+              </a:lnSpc>
+              <a:spcBef>
+                <a:spcPct val="0"/>
+              </a:spcBef>
+              <a:spcAft>
+                <a:spcPct val="35000"/>
+              </a:spcAft>
+              <a:defRPr cap="all"/>
+            </a:pPr>
+            <a:r>
+              <a:rPr lang="en-US" sz="1000" kern="1200" dirty="0"/>
+              <a:t>Data</a:t>
+            </a:r>
+          </a:p>
+        </p:txBody>
+      </p:sp>
+      <p:sp>
+        <p:nvSpPr>
+          <p:cNvPr id="48" name="TextBox 47">
+            <a:extLst>
+              <a:ext uri="{FF2B5EF4-FFF2-40B4-BE49-F238E27FC236}">
+                <a16:creationId xmlns:a16="http://schemas.microsoft.com/office/drawing/2014/main" id="{9C2E39C6-1CEA-FB4F-A7BB-BA153A5A73F2}"/>
+              </a:ext>
+            </a:extLst>
+          </p:cNvPr>
+          <p:cNvSpPr txBox="1"/>
+          <p:nvPr/>
+        </p:nvSpPr>
+        <p:spPr>
+          <a:xfrm>
+            <a:off x="4912815" y="5073444"/>
+            <a:ext cx="1488867" cy="595546"/>
+          </a:xfrm>
+          <a:prstGeom prst="rect">
+            <a:avLst/>
+          </a:prstGeom>
+        </p:spPr>
+        <p:style>
+          <a:lnRef idx="0">
+            <a:scrgbClr r="0" g="0" b="0"/>
+          </a:lnRef>
+          <a:fillRef idx="0">
+            <a:scrgbClr r="0" g="0" b="0"/>
+          </a:fillRef>
+          <a:effectRef idx="0">
+            <a:scrgbClr r="0" g="0" b="0"/>
+          </a:effectRef>
+          <a:fontRef idx="minor">
+            <a:schemeClr val="tx1">
+              <a:hueOff val="0"/>
+              <a:satOff val="0"/>
+              <a:lumOff val="0"/>
+              <a:alphaOff val="0"/>
+            </a:schemeClr>
+          </a:fontRef>
+        </p:style>
+        <p:txBody>
+          <a:bodyPr spcFirstLastPara="0" vert="horz" wrap="square" lIns="0" tIns="0" rIns="0" bIns="0" numCol="1" spcCol="1270" anchor="t" anchorCtr="0">
+            <a:noAutofit/>
+          </a:bodyPr>
+          <a:lstStyle/>
+          <a:p>
+            <a:pPr marL="0" lvl="0" indent="0" algn="ctr" defTabSz="533400">
+              <a:lnSpc>
+                <a:spcPct val="90000"/>
+              </a:lnSpc>
+              <a:spcBef>
+                <a:spcPct val="0"/>
+              </a:spcBef>
+              <a:spcAft>
+                <a:spcPct val="35000"/>
+              </a:spcAft>
+              <a:buNone/>
+              <a:defRPr cap="all"/>
+            </a:pPr>
+            <a:r>
+              <a:rPr lang="en-US" sz="1200" kern="1200" dirty="0"/>
+              <a:t>Structured data</a:t>
+            </a:r>
+          </a:p>
+        </p:txBody>
+      </p:sp>
+      <p:sp>
+        <p:nvSpPr>
+          <p:cNvPr id="49" name="TextBox 48">
+            <a:extLst>
+              <a:ext uri="{FF2B5EF4-FFF2-40B4-BE49-F238E27FC236}">
+                <a16:creationId xmlns:a16="http://schemas.microsoft.com/office/drawing/2014/main" id="{7985E5E3-64CB-D24F-A23B-5054249B516F}"/>
+              </a:ext>
+            </a:extLst>
+          </p:cNvPr>
+          <p:cNvSpPr txBox="1"/>
+          <p:nvPr/>
+        </p:nvSpPr>
+        <p:spPr>
+          <a:xfrm>
+            <a:off x="-119636" y="4326230"/>
+            <a:ext cx="1359434" cy="427258"/>
+          </a:xfrm>
+          <a:prstGeom prst="rect">
+            <a:avLst/>
+          </a:prstGeom>
+        </p:spPr>
+        <p:style>
+          <a:lnRef idx="0">
+            <a:scrgbClr r="0" g="0" b="0"/>
+          </a:lnRef>
+          <a:fillRef idx="0">
+            <a:scrgbClr r="0" g="0" b="0"/>
+          </a:fillRef>
+          <a:effectRef idx="0">
+            <a:scrgbClr r="0" g="0" b="0"/>
+          </a:effectRef>
+          <a:fontRef idx="minor">
+            <a:schemeClr val="tx1">
+              <a:hueOff val="0"/>
+              <a:satOff val="0"/>
+              <a:lumOff val="0"/>
+              <a:alphaOff val="0"/>
+            </a:schemeClr>
+          </a:fontRef>
+        </p:style>
+        <p:txBody>
+          <a:bodyPr spcFirstLastPara="0" vert="horz" wrap="square" lIns="0" tIns="0" rIns="0" bIns="0" numCol="1" spcCol="1270" anchor="t" anchorCtr="0">
+            <a:noAutofit/>
+          </a:bodyPr>
+          <a:lstStyle/>
+          <a:p>
+            <a:pPr algn="ctr" defTabSz="533400">
+              <a:lnSpc>
+                <a:spcPct val="90000"/>
+              </a:lnSpc>
+              <a:spcBef>
+                <a:spcPct val="0"/>
+              </a:spcBef>
+              <a:spcAft>
+                <a:spcPct val="35000"/>
+              </a:spcAft>
+              <a:defRPr cap="all"/>
+            </a:pPr>
+            <a:r>
+              <a:rPr lang="en-US" sz="1000" kern="1200" dirty="0"/>
+              <a:t>Twitter posts</a:t>
+            </a:r>
+          </a:p>
+        </p:txBody>
+      </p:sp>
+      <p:sp>
+        <p:nvSpPr>
+          <p:cNvPr id="50" name="TextBox 49">
+            <a:extLst>
+              <a:ext uri="{FF2B5EF4-FFF2-40B4-BE49-F238E27FC236}">
+                <a16:creationId xmlns:a16="http://schemas.microsoft.com/office/drawing/2014/main" id="{5E145573-A8A8-5740-8A83-8A913416D8A0}"/>
+              </a:ext>
+            </a:extLst>
+          </p:cNvPr>
+          <p:cNvSpPr txBox="1"/>
+          <p:nvPr/>
+        </p:nvSpPr>
+        <p:spPr>
+          <a:xfrm>
+            <a:off x="-86478" y="5575531"/>
+            <a:ext cx="1359434" cy="427258"/>
+          </a:xfrm>
+          <a:prstGeom prst="rect">
+            <a:avLst/>
+          </a:prstGeom>
+        </p:spPr>
+        <p:style>
+          <a:lnRef idx="0">
+            <a:scrgbClr r="0" g="0" b="0"/>
+          </a:lnRef>
+          <a:fillRef idx="0">
+            <a:scrgbClr r="0" g="0" b="0"/>
+          </a:fillRef>
+          <a:effectRef idx="0">
+            <a:scrgbClr r="0" g="0" b="0"/>
+          </a:effectRef>
+          <a:fontRef idx="minor">
+            <a:schemeClr val="tx1">
+              <a:hueOff val="0"/>
+              <a:satOff val="0"/>
+              <a:lumOff val="0"/>
+              <a:alphaOff val="0"/>
+            </a:schemeClr>
+          </a:fontRef>
+        </p:style>
+        <p:txBody>
+          <a:bodyPr spcFirstLastPara="0" vert="horz" wrap="square" lIns="0" tIns="0" rIns="0" bIns="0" numCol="1" spcCol="1270" anchor="t" anchorCtr="0">
+            <a:noAutofit/>
+          </a:bodyPr>
+          <a:lstStyle/>
+          <a:p>
+            <a:pPr algn="ctr" defTabSz="533400">
+              <a:lnSpc>
+                <a:spcPct val="90000"/>
+              </a:lnSpc>
+              <a:spcBef>
+                <a:spcPct val="0"/>
+              </a:spcBef>
+              <a:spcAft>
+                <a:spcPct val="35000"/>
+              </a:spcAft>
+              <a:defRPr cap="all"/>
+            </a:pPr>
+            <a:r>
+              <a:rPr lang="en-US" sz="1000" kern="1200" dirty="0"/>
+              <a:t>Static twitter</a:t>
+            </a:r>
+          </a:p>
+          <a:p>
+            <a:pPr algn="ctr" defTabSz="533400">
+              <a:lnSpc>
+                <a:spcPct val="90000"/>
+              </a:lnSpc>
+              <a:spcBef>
+                <a:spcPct val="0"/>
+              </a:spcBef>
+              <a:spcAft>
+                <a:spcPct val="35000"/>
+              </a:spcAft>
+              <a:defRPr cap="all"/>
+            </a:pPr>
+            <a:r>
+              <a:rPr lang="en-US" sz="1000" dirty="0"/>
+              <a:t>storage</a:t>
+            </a:r>
+            <a:endParaRPr lang="en-US" sz="1000" kern="1200" dirty="0"/>
+          </a:p>
+        </p:txBody>
+      </p:sp>
+      <p:pic>
+        <p:nvPicPr>
+          <p:cNvPr id="5" name="Picture 4">
+            <a:extLst>
+              <a:ext uri="{FF2B5EF4-FFF2-40B4-BE49-F238E27FC236}">
+                <a16:creationId xmlns:a16="http://schemas.microsoft.com/office/drawing/2014/main" id="{2E0601B8-F7BF-EB41-8CFC-A54244F644E9}"/>
+              </a:ext>
+            </a:extLst>
+          </p:cNvPr>
+          <p:cNvPicPr>
+            <a:picLocks noChangeAspect="1"/>
+          </p:cNvPicPr>
+          <p:nvPr/>
+        </p:nvPicPr>
+        <p:blipFill>
+          <a:blip r:embed="rId12"/>
+          <a:stretch>
+            <a:fillRect/>
+          </a:stretch>
+        </p:blipFill>
+        <p:spPr>
+          <a:xfrm>
+            <a:off x="10162536" y="4005544"/>
+            <a:ext cx="1818102" cy="930134"/>
+          </a:xfrm>
+          <a:prstGeom prst="rect">
+            <a:avLst/>
+          </a:prstGeom>
+          <a:ln>
+            <a:solidFill>
+              <a:schemeClr val="accent1"/>
+            </a:solidFill>
+          </a:ln>
+        </p:spPr>
+      </p:pic>
+      <p:sp>
+        <p:nvSpPr>
+          <p:cNvPr id="19" name="Rounded Rectangle 18">
+            <a:extLst>
+              <a:ext uri="{FF2B5EF4-FFF2-40B4-BE49-F238E27FC236}">
+                <a16:creationId xmlns:a16="http://schemas.microsoft.com/office/drawing/2014/main" id="{AFEAAB7F-2D5F-0045-87C2-25AF64CFBDDC}"/>
+              </a:ext>
+            </a:extLst>
+          </p:cNvPr>
+          <p:cNvSpPr/>
+          <p:nvPr/>
+        </p:nvSpPr>
+        <p:spPr>
+          <a:xfrm>
+            <a:off x="10062691" y="3086757"/>
+            <a:ext cx="2028590" cy="2043027"/>
+          </a:xfrm>
+          <a:prstGeom prst="roundRect">
+            <a:avLst>
+              <a:gd name="adj" fmla="val 5248"/>
+            </a:avLst>
+          </a:prstGeom>
+          <a:noFill/>
+        </p:spPr>
+        <p:style>
+          <a:lnRef idx="2">
+            <a:schemeClr val="accent1">
+              <a:shade val="50000"/>
+            </a:schemeClr>
+          </a:lnRef>
+          <a:fillRef idx="1">
+            <a:schemeClr val="accent1"/>
+          </a:fillRef>
+          <a:effectRef idx="0">
+            <a:schemeClr val="accent1"/>
+          </a:effectRef>
+          <a:fontRef idx="minor">
+            <a:schemeClr val="lt1"/>
+          </a:fontRef>
+        </p:style>
+        <p:txBody>
+          <a:bodyPr rtlCol="0" anchor="ctr"/>
+          <a:lstStyle/>
+          <a:p>
+            <a:pPr algn="ctr"/>
+            <a:endParaRPr lang="en-US"/>
+          </a:p>
+        </p:txBody>
+      </p:sp>
+    </p:spTree>
+    <p:extLst>
+      <p:ext uri="{BB962C8B-B14F-4D97-AF65-F5344CB8AC3E}">
+        <p14:creationId xmlns:p14="http://schemas.microsoft.com/office/powerpoint/2010/main" val="3045125378"/>
       </p:ext>
     </p:extLst>
   </p:cSld>

</xml_diff>